<commit_message>
Updated presentation part (PreF)
</commit_message>
<xml_diff>
--- a/PredictionFeature/Prediction Feature.pptx
+++ b/PredictionFeature/Prediction Feature.pptx
@@ -2671,7 +2671,7 @@
             </a:r>
             <a:r>
               <a:rPr lang="en-US" altLang="uk-UA" sz="3600"/>
-              <a:t>Python3.6 and MongoDB</a:t>
+              <a:t>Python3.6</a:t>
             </a:r>
             <a:endParaRPr lang="en-US" altLang="uk-UA" sz="3600"/>
           </a:p>
@@ -2900,30 +2900,32 @@
       </p:sp>
       <p:graphicFrame>
         <p:nvGraphicFramePr>
-          <p:cNvPr id="10" name="Content Placeholder 9"/>
-          <p:cNvGraphicFramePr/>
+          <p:cNvPr id="6" name="Content Placeholder 5"/>
+          <p:cNvGraphicFramePr>
+            <a:graphicFrameLocks noChangeAspect="1"/>
+          </p:cNvGraphicFramePr>
           <p:nvPr>
             <p:ph idx="1"/>
           </p:nvPr>
         </p:nvGraphicFramePr>
         <p:xfrm>
-          <a:off x="838200" y="1781074"/>
-          <a:ext cx="10515600" cy="3908309"/>
+          <a:off x="838200" y="1841500"/>
+          <a:ext cx="10515600" cy="3759200"/>
         </p:xfrm>
         <a:graphic>
           <a:graphicData uri="http://schemas.openxmlformats.org/presentationml/2006/ole">
             <mc:AlternateContent xmlns:mc="http://schemas.openxmlformats.org/markup-compatibility/2006">
               <mc:Choice xmlns:v="urn:schemas-microsoft-com:vml" Requires="v">
-                <p:oleObj spid="_x0000_s11" name="" r:id="rId1" imgW="10687050" imgH="3971925" progId="Paint.Picture">
+                <p:oleObj spid="_x0000_s7" name="" r:id="rId1" imgW="10896600" imgH="3895725" progId="Paint.Picture">
                   <p:embed/>
                 </p:oleObj>
               </mc:Choice>
               <mc:Fallback>
-                <p:oleObj name="" r:id="rId1" imgW="10687050" imgH="3971925" progId="Paint.Picture">
+                <p:oleObj name="" r:id="rId1" imgW="10896600" imgH="3895725" progId="Paint.Picture">
                   <p:embed/>
                   <p:pic>
                     <p:nvPicPr>
-                      <p:cNvPr id="0" name="Picture 10"/>
+                      <p:cNvPr id="0" name="Picture 6"/>
                       <p:cNvPicPr/>
                       <p:nvPr/>
                     </p:nvPicPr>
@@ -2935,8 +2937,8 @@
                     </p:blipFill>
                     <p:spPr>
                       <a:xfrm>
-                        <a:off x="838200" y="1781074"/>
-                        <a:ext cx="10515600" cy="3908309"/>
+                        <a:off x="838200" y="1841500"/>
+                        <a:ext cx="10515600" cy="3759200"/>
                       </a:xfrm>
                       <a:prstGeom prst="rect">
                         <a:avLst/>

</xml_diff>